<commit_message>
Added slide for bilinear interpolation.
</commit_message>
<xml_diff>
--- a/General Morphing.pptx
+++ b/General Morphing.pptx
@@ -13,19 +13,20 @@
     <p:sldId id="276" r:id="rId7"/>
     <p:sldId id="277" r:id="rId8"/>
     <p:sldId id="278" r:id="rId9"/>
-    <p:sldId id="262" r:id="rId10"/>
-    <p:sldId id="260" r:id="rId11"/>
-    <p:sldId id="263" r:id="rId12"/>
-    <p:sldId id="264" r:id="rId13"/>
-    <p:sldId id="266" r:id="rId14"/>
-    <p:sldId id="265" r:id="rId15"/>
-    <p:sldId id="267" r:id="rId16"/>
-    <p:sldId id="268" r:id="rId17"/>
-    <p:sldId id="269" r:id="rId18"/>
-    <p:sldId id="272" r:id="rId19"/>
-    <p:sldId id="270" r:id="rId20"/>
-    <p:sldId id="271" r:id="rId21"/>
-    <p:sldId id="273" r:id="rId22"/>
+    <p:sldId id="279" r:id="rId10"/>
+    <p:sldId id="262" r:id="rId11"/>
+    <p:sldId id="260" r:id="rId12"/>
+    <p:sldId id="263" r:id="rId13"/>
+    <p:sldId id="264" r:id="rId14"/>
+    <p:sldId id="266" r:id="rId15"/>
+    <p:sldId id="265" r:id="rId16"/>
+    <p:sldId id="267" r:id="rId17"/>
+    <p:sldId id="268" r:id="rId18"/>
+    <p:sldId id="269" r:id="rId19"/>
+    <p:sldId id="272" r:id="rId20"/>
+    <p:sldId id="270" r:id="rId21"/>
+    <p:sldId id="271" r:id="rId22"/>
+    <p:sldId id="273" r:id="rId23"/>
   </p:sldIdLst>
   <p:sldSz cx="12192000" cy="6858000"/>
   <p:notesSz cx="6858000" cy="9144000"/>
@@ -5443,6 +5444,129 @@
           <a:p>
             <a:r>
               <a:rPr lang="en-US" dirty="0" smtClean="0"/>
+              <a:t>Not the Best Solution</a:t>
+            </a:r>
+            <a:endParaRPr lang="en-US" dirty="0"/>
+          </a:p>
+        </p:txBody>
+      </p:sp>
+      <p:sp>
+        <p:nvSpPr>
+          <p:cNvPr id="3" name="Content Placeholder 2"/>
+          <p:cNvSpPr>
+            <a:spLocks noGrp="1"/>
+          </p:cNvSpPr>
+          <p:nvPr>
+            <p:ph idx="1"/>
+          </p:nvPr>
+        </p:nvSpPr>
+        <p:spPr>
+          <a:xfrm>
+            <a:off x="684212" y="685800"/>
+            <a:ext cx="6171047" cy="3615267"/>
+          </a:xfrm>
+        </p:spPr>
+        <p:txBody>
+          <a:bodyPr/>
+          <a:lstStyle/>
+          <a:p>
+            <a:r>
+              <a:rPr lang="en-US" dirty="0" smtClean="0"/>
+              <a:t>Works well for mapping triangles</a:t>
+            </a:r>
+          </a:p>
+          <a:p>
+            <a:r>
+              <a:rPr lang="en-US" dirty="0" smtClean="0"/>
+              <a:t>Done piecewise on other shapes</a:t>
+            </a:r>
+          </a:p>
+          <a:p>
+            <a:r>
+              <a:rPr lang="en-US" dirty="0" smtClean="0"/>
+              <a:t>The transformation is continuous, but there is discontinuity in the first derivative</a:t>
+            </a:r>
+            <a:endParaRPr lang="en-US" dirty="0"/>
+          </a:p>
+        </p:txBody>
+      </p:sp>
+      <p:pic>
+        <p:nvPicPr>
+          <p:cNvPr id="7" name="Picture 6"/>
+          <p:cNvPicPr>
+            <a:picLocks noChangeAspect="1"/>
+          </p:cNvPicPr>
+          <p:nvPr/>
+        </p:nvPicPr>
+        <p:blipFill>
+          <a:blip r:embed="rId2">
+            <a:extLst>
+              <a:ext uri="{28A0092B-C50C-407E-A947-70E740481C1C}">
+                <a14:useLocalDpi xmlns:a14="http://schemas.microsoft.com/office/drawing/2010/main" val="0"/>
+              </a:ext>
+            </a:extLst>
+          </a:blip>
+          <a:stretch>
+            <a:fillRect/>
+          </a:stretch>
+        </p:blipFill>
+        <p:spPr>
+          <a:xfrm>
+            <a:off x="6855259" y="1091045"/>
+            <a:ext cx="4726706" cy="2836719"/>
+          </a:xfrm>
+          <a:prstGeom prst="rect">
+            <a:avLst/>
+          </a:prstGeom>
+        </p:spPr>
+      </p:pic>
+    </p:spTree>
+    <p:extLst>
+      <p:ext uri="{BB962C8B-B14F-4D97-AF65-F5344CB8AC3E}">
+        <p14:creationId xmlns:p14="http://schemas.microsoft.com/office/powerpoint/2010/main" val="4098256161"/>
+      </p:ext>
+    </p:extLst>
+  </p:cSld>
+  <p:clrMapOvr>
+    <a:masterClrMapping/>
+  </p:clrMapOvr>
+</p:sld>
+</file>
+
+<file path=ppt/slides/slide11.xml><?xml version="1.0" encoding="utf-8"?>
+<p:sld xmlns:a="http://schemas.openxmlformats.org/drawingml/2006/main" xmlns:r="http://schemas.openxmlformats.org/officeDocument/2006/relationships" xmlns:p="http://schemas.openxmlformats.org/presentationml/2006/main">
+  <p:cSld>
+    <p:spTree>
+      <p:nvGrpSpPr>
+        <p:cNvPr id="1" name=""/>
+        <p:cNvGrpSpPr/>
+        <p:nvPr/>
+      </p:nvGrpSpPr>
+      <p:grpSpPr>
+        <a:xfrm>
+          <a:off x="0" y="0"/>
+          <a:ext cx="0" cy="0"/>
+          <a:chOff x="0" y="0"/>
+          <a:chExt cx="0" cy="0"/>
+        </a:xfrm>
+      </p:grpSpPr>
+      <p:sp>
+        <p:nvSpPr>
+          <p:cNvPr id="2" name="Title 1"/>
+          <p:cNvSpPr>
+            <a:spLocks noGrp="1"/>
+          </p:cNvSpPr>
+          <p:nvPr>
+            <p:ph type="title"/>
+          </p:nvPr>
+        </p:nvSpPr>
+        <p:spPr/>
+        <p:txBody>
+          <a:bodyPr/>
+          <a:lstStyle/>
+          <a:p>
+            <a:r>
+              <a:rPr lang="en-US" dirty="0" smtClean="0"/>
               <a:t>Bilinear and Perspective</a:t>
             </a:r>
             <a:endParaRPr lang="en-US" dirty="0"/>
@@ -5462,7 +5586,7 @@
 </p:sld>
 </file>
 
-<file path=ppt/slides/slide11.xml><?xml version="1.0" encoding="utf-8"?>
+<file path=ppt/slides/slide12.xml><?xml version="1.0" encoding="utf-8"?>
 <p:sld xmlns:a="http://schemas.openxmlformats.org/drawingml/2006/main" xmlns:r="http://schemas.openxmlformats.org/officeDocument/2006/relationships" xmlns:p="http://schemas.openxmlformats.org/presentationml/2006/main">
   <p:cSld>
     <p:spTree>
@@ -5608,7 +5732,7 @@
 </p:sld>
 </file>
 
-<file path=ppt/slides/slide12.xml><?xml version="1.0" encoding="utf-8"?>
+<file path=ppt/slides/slide13.xml><?xml version="1.0" encoding="utf-8"?>
 <p:sld xmlns:a="http://schemas.openxmlformats.org/drawingml/2006/main" xmlns:r="http://schemas.openxmlformats.org/officeDocument/2006/relationships" xmlns:p="http://schemas.openxmlformats.org/presentationml/2006/main">
   <p:cSld>
     <p:spTree>
@@ -5718,7 +5842,7 @@
 </p:sld>
 </file>
 
-<file path=ppt/slides/slide13.xml><?xml version="1.0" encoding="utf-8"?>
+<file path=ppt/slides/slide14.xml><?xml version="1.0" encoding="utf-8"?>
 <p:sld xmlns:a="http://schemas.openxmlformats.org/drawingml/2006/main" xmlns:r="http://schemas.openxmlformats.org/officeDocument/2006/relationships" xmlns:p="http://schemas.openxmlformats.org/presentationml/2006/main">
   <p:cSld>
     <p:spTree>
@@ -5806,7 +5930,7 @@
 </p:sld>
 </file>
 
-<file path=ppt/slides/slide14.xml><?xml version="1.0" encoding="utf-8"?>
+<file path=ppt/slides/slide15.xml><?xml version="1.0" encoding="utf-8"?>
 <p:sld xmlns:a="http://schemas.openxmlformats.org/drawingml/2006/main" xmlns:r="http://schemas.openxmlformats.org/officeDocument/2006/relationships" xmlns:p="http://schemas.openxmlformats.org/presentationml/2006/main">
   <p:cSld>
     <p:spTree>
@@ -6613,7 +6737,7 @@
 </p:sld>
 </file>
 
-<file path=ppt/slides/slide15.xml><?xml version="1.0" encoding="utf-8"?>
+<file path=ppt/slides/slide16.xml><?xml version="1.0" encoding="utf-8"?>
 <p:sld xmlns:a="http://schemas.openxmlformats.org/drawingml/2006/main" xmlns:r="http://schemas.openxmlformats.org/officeDocument/2006/relationships" xmlns:p="http://schemas.openxmlformats.org/presentationml/2006/main">
   <p:cSld>
     <p:spTree>
@@ -6653,8 +6777,8 @@
           </a:p>
         </p:txBody>
       </p:sp>
-      <mc:AlternateContent xmlns:mc="http://schemas.openxmlformats.org/markup-compatibility/2006">
-        <mc:Choice xmlns:a14="http://schemas.microsoft.com/office/drawing/2010/main" Requires="a14">
+      <mc:AlternateContent xmlns:mc="http://schemas.openxmlformats.org/markup-compatibility/2006" xmlns:a14="http://schemas.microsoft.com/office/drawing/2010/main">
+        <mc:Choice Requires="a14">
           <p:sp>
             <p:nvSpPr>
               <p:cNvPr id="3" name="Content Placeholder 2"/>
@@ -6672,15 +6796,7 @@
               <a:p>
                 <a:r>
                   <a:rPr lang="en-US" dirty="0" smtClean="0"/>
-                  <a:t>The </a:t>
-                </a:r>
-                <a:r>
-                  <a:rPr lang="en-US" dirty="0" smtClean="0"/>
-                  <a:t>Inverse </a:t>
-                </a:r>
-                <a:r>
-                  <a:rPr lang="en-US" dirty="0" smtClean="0"/>
-                  <a:t>is:</a:t>
+                  <a:t>The Inverse is:</a:t>
                 </a:r>
               </a:p>
               <a:p>
@@ -6896,7 +7012,7 @@
             </p:txBody>
           </p:sp>
         </mc:Choice>
-        <mc:Fallback>
+        <mc:Fallback xmlns="">
           <p:sp>
             <p:nvSpPr>
               <p:cNvPr id="3" name="Content Placeholder 2"/>
@@ -6943,7 +7059,7 @@
 </p:sld>
 </file>
 
-<file path=ppt/slides/slide16.xml><?xml version="1.0" encoding="utf-8"?>
+<file path=ppt/slides/slide17.xml><?xml version="1.0" encoding="utf-8"?>
 <p:sld xmlns:a="http://schemas.openxmlformats.org/drawingml/2006/main" xmlns:r="http://schemas.openxmlformats.org/officeDocument/2006/relationships" xmlns:p="http://schemas.openxmlformats.org/presentationml/2006/main">
   <p:cSld>
     <p:spTree>
@@ -7481,7 +7597,7 @@
 </p:sld>
 </file>
 
-<file path=ppt/slides/slide17.xml><?xml version="1.0" encoding="utf-8"?>
+<file path=ppt/slides/slide18.xml><?xml version="1.0" encoding="utf-8"?>
 <p:sld xmlns:a="http://schemas.openxmlformats.org/drawingml/2006/main" xmlns:r="http://schemas.openxmlformats.org/officeDocument/2006/relationships" xmlns:p="http://schemas.openxmlformats.org/presentationml/2006/main">
   <p:cSld>
     <p:spTree>
@@ -8329,7 +8445,7 @@
 </p:sld>
 </file>
 
-<file path=ppt/slides/slide18.xml><?xml version="1.0" encoding="utf-8"?>
+<file path=ppt/slides/slide19.xml><?xml version="1.0" encoding="utf-8"?>
 <p:sld xmlns:a="http://schemas.openxmlformats.org/drawingml/2006/main" xmlns:r="http://schemas.openxmlformats.org/officeDocument/2006/relationships" xmlns:p="http://schemas.openxmlformats.org/presentationml/2006/main">
   <p:cSld>
     <p:spTree>
@@ -10169,90 +10285,6 @@
 </p:sld>
 </file>
 
-<file path=ppt/slides/slide19.xml><?xml version="1.0" encoding="utf-8"?>
-<p:sld xmlns:a="http://schemas.openxmlformats.org/drawingml/2006/main" xmlns:r="http://schemas.openxmlformats.org/officeDocument/2006/relationships" xmlns:p="http://schemas.openxmlformats.org/presentationml/2006/main">
-  <p:cSld>
-    <p:spTree>
-      <p:nvGrpSpPr>
-        <p:cNvPr id="1" name=""/>
-        <p:cNvGrpSpPr/>
-        <p:nvPr/>
-      </p:nvGrpSpPr>
-      <p:grpSpPr>
-        <a:xfrm>
-          <a:off x="0" y="0"/>
-          <a:ext cx="0" cy="0"/>
-          <a:chOff x="0" y="0"/>
-          <a:chExt cx="0" cy="0"/>
-        </a:xfrm>
-      </p:grpSpPr>
-      <p:sp>
-        <p:nvSpPr>
-          <p:cNvPr id="2" name="Title 1"/>
-          <p:cNvSpPr>
-            <a:spLocks noGrp="1"/>
-          </p:cNvSpPr>
-          <p:nvPr>
-            <p:ph type="title"/>
-          </p:nvPr>
-        </p:nvSpPr>
-        <p:spPr/>
-        <p:txBody>
-          <a:bodyPr/>
-          <a:lstStyle/>
-          <a:p>
-            <a:r>
-              <a:rPr lang="en-US" dirty="0" smtClean="0"/>
-              <a:t>Case 2: Quadrilateral to Square</a:t>
-            </a:r>
-            <a:endParaRPr lang="en-US" dirty="0"/>
-          </a:p>
-        </p:txBody>
-      </p:sp>
-      <p:sp>
-        <p:nvSpPr>
-          <p:cNvPr id="3" name="Content Placeholder 2"/>
-          <p:cNvSpPr>
-            <a:spLocks noGrp="1"/>
-          </p:cNvSpPr>
-          <p:nvPr>
-            <p:ph idx="1"/>
-          </p:nvPr>
-        </p:nvSpPr>
-        <p:spPr/>
-        <p:txBody>
-          <a:bodyPr/>
-          <a:lstStyle/>
-          <a:p>
-            <a:r>
-              <a:rPr lang="en-US" dirty="0" smtClean="0"/>
-              <a:t>Do Case 1 then find the inverse matrix (the </a:t>
-            </a:r>
-            <a:r>
-              <a:rPr lang="en-US" dirty="0" err="1" smtClean="0"/>
-              <a:t>Adj</a:t>
-            </a:r>
-            <a:r>
-              <a:rPr lang="en-US" dirty="0" smtClean="0"/>
-              <a:t> of the A you get)</a:t>
-            </a:r>
-            <a:endParaRPr lang="en-US" dirty="0"/>
-          </a:p>
-        </p:txBody>
-      </p:sp>
-    </p:spTree>
-    <p:extLst>
-      <p:ext uri="{BB962C8B-B14F-4D97-AF65-F5344CB8AC3E}">
-        <p14:creationId xmlns:p14="http://schemas.microsoft.com/office/powerpoint/2010/main" val="3974130409"/>
-      </p:ext>
-    </p:extLst>
-  </p:cSld>
-  <p:clrMapOvr>
-    <a:masterClrMapping/>
-  </p:clrMapOvr>
-</p:sld>
-</file>
-
 <file path=ppt/slides/slide2.xml><?xml version="1.0" encoding="utf-8"?>
 <p:sld xmlns:a="http://schemas.openxmlformats.org/drawingml/2006/main" xmlns:r="http://schemas.openxmlformats.org/officeDocument/2006/relationships" xmlns:p="http://schemas.openxmlformats.org/presentationml/2006/main">
   <p:cSld>
@@ -10387,7 +10419,7 @@
           <a:p>
             <a:r>
               <a:rPr lang="en-US" dirty="0" smtClean="0"/>
-              <a:t>Case 3: Quadrilateral to Quadrilateral</a:t>
+              <a:t>Case 2: Quadrilateral to Square</a:t>
             </a:r>
             <a:endParaRPr lang="en-US" dirty="0"/>
           </a:p>
@@ -10410,6 +10442,90 @@
           <a:p>
             <a:r>
               <a:rPr lang="en-US" dirty="0" smtClean="0"/>
+              <a:t>Do Case 1 then find the inverse matrix (the </a:t>
+            </a:r>
+            <a:r>
+              <a:rPr lang="en-US" dirty="0" err="1" smtClean="0"/>
+              <a:t>Adj</a:t>
+            </a:r>
+            <a:r>
+              <a:rPr lang="en-US" dirty="0" smtClean="0"/>
+              <a:t> of the A you get)</a:t>
+            </a:r>
+            <a:endParaRPr lang="en-US" dirty="0"/>
+          </a:p>
+        </p:txBody>
+      </p:sp>
+    </p:spTree>
+    <p:extLst>
+      <p:ext uri="{BB962C8B-B14F-4D97-AF65-F5344CB8AC3E}">
+        <p14:creationId xmlns:p14="http://schemas.microsoft.com/office/powerpoint/2010/main" val="3974130409"/>
+      </p:ext>
+    </p:extLst>
+  </p:cSld>
+  <p:clrMapOvr>
+    <a:masterClrMapping/>
+  </p:clrMapOvr>
+</p:sld>
+</file>
+
+<file path=ppt/slides/slide21.xml><?xml version="1.0" encoding="utf-8"?>
+<p:sld xmlns:a="http://schemas.openxmlformats.org/drawingml/2006/main" xmlns:r="http://schemas.openxmlformats.org/officeDocument/2006/relationships" xmlns:p="http://schemas.openxmlformats.org/presentationml/2006/main">
+  <p:cSld>
+    <p:spTree>
+      <p:nvGrpSpPr>
+        <p:cNvPr id="1" name=""/>
+        <p:cNvGrpSpPr/>
+        <p:nvPr/>
+      </p:nvGrpSpPr>
+      <p:grpSpPr>
+        <a:xfrm>
+          <a:off x="0" y="0"/>
+          <a:ext cx="0" cy="0"/>
+          <a:chOff x="0" y="0"/>
+          <a:chExt cx="0" cy="0"/>
+        </a:xfrm>
+      </p:grpSpPr>
+      <p:sp>
+        <p:nvSpPr>
+          <p:cNvPr id="2" name="Title 1"/>
+          <p:cNvSpPr>
+            <a:spLocks noGrp="1"/>
+          </p:cNvSpPr>
+          <p:nvPr>
+            <p:ph type="title"/>
+          </p:nvPr>
+        </p:nvSpPr>
+        <p:spPr/>
+        <p:txBody>
+          <a:bodyPr/>
+          <a:lstStyle/>
+          <a:p>
+            <a:r>
+              <a:rPr lang="en-US" dirty="0" smtClean="0"/>
+              <a:t>Case 3: Quadrilateral to Quadrilateral</a:t>
+            </a:r>
+            <a:endParaRPr lang="en-US" dirty="0"/>
+          </a:p>
+        </p:txBody>
+      </p:sp>
+      <p:sp>
+        <p:nvSpPr>
+          <p:cNvPr id="3" name="Content Placeholder 2"/>
+          <p:cNvSpPr>
+            <a:spLocks noGrp="1"/>
+          </p:cNvSpPr>
+          <p:nvPr>
+            <p:ph idx="1"/>
+          </p:nvPr>
+        </p:nvSpPr>
+        <p:spPr/>
+        <p:txBody>
+          <a:bodyPr/>
+          <a:lstStyle/>
+          <a:p>
+            <a:r>
+              <a:rPr lang="en-US" dirty="0" smtClean="0"/>
               <a:t>Do case 2 then Case 1</a:t>
             </a:r>
             <a:endParaRPr lang="en-US" dirty="0"/>
@@ -10429,7 +10545,7 @@
 </p:sld>
 </file>
 
-<file path=ppt/slides/slide21.xml><?xml version="1.0" encoding="utf-8"?>
+<file path=ppt/slides/slide22.xml><?xml version="1.0" encoding="utf-8"?>
 <p:sld xmlns:a="http://schemas.openxmlformats.org/drawingml/2006/main" xmlns:r="http://schemas.openxmlformats.org/officeDocument/2006/relationships" xmlns:p="http://schemas.openxmlformats.org/presentationml/2006/main">
   <p:cSld>
     <p:spTree>
@@ -10756,8 +10872,8 @@
           </a:p>
         </p:txBody>
       </p:sp>
-      <mc:AlternateContent xmlns:mc="http://schemas.openxmlformats.org/markup-compatibility/2006">
-        <mc:Choice xmlns:a14="http://schemas.microsoft.com/office/drawing/2010/main" Requires="a14">
+      <mc:AlternateContent xmlns:mc="http://schemas.openxmlformats.org/markup-compatibility/2006" xmlns:a14="http://schemas.microsoft.com/office/drawing/2010/main">
+        <mc:Choice Requires="a14">
           <p:sp>
             <p:nvSpPr>
               <p:cNvPr id="5" name="Content Placeholder 4"/>
@@ -11240,7 +11356,7 @@
             </p:txBody>
           </p:sp>
         </mc:Choice>
-        <mc:Fallback>
+        <mc:Fallback xmlns="">
           <p:sp>
             <p:nvSpPr>
               <p:cNvPr id="5" name="Content Placeholder 4"/>
@@ -11339,8 +11455,8 @@
           </a:p>
         </p:txBody>
       </p:sp>
-      <mc:AlternateContent xmlns:mc="http://schemas.openxmlformats.org/markup-compatibility/2006">
-        <mc:Choice xmlns:a14="http://schemas.microsoft.com/office/drawing/2010/main" Requires="a14">
+      <mc:AlternateContent xmlns:mc="http://schemas.openxmlformats.org/markup-compatibility/2006" xmlns:a14="http://schemas.microsoft.com/office/drawing/2010/main">
+        <mc:Choice Requires="a14">
           <p:graphicFrame>
             <p:nvGraphicFramePr>
               <p:cNvPr id="4" name="Content Placeholder 3"/>
@@ -12911,7 +13027,7 @@
             </a:graphic>
           </p:graphicFrame>
         </mc:Choice>
-        <mc:Fallback>
+        <mc:Fallback xmlns="">
           <p:graphicFrame>
             <p:nvGraphicFramePr>
               <p:cNvPr id="4" name="Content Placeholder 3"/>
@@ -13312,8 +13428,8 @@
           </a:p>
         </p:txBody>
       </p:sp>
-      <mc:AlternateContent xmlns:mc="http://schemas.openxmlformats.org/markup-compatibility/2006">
-        <mc:Choice xmlns:a14="http://schemas.microsoft.com/office/drawing/2010/main" Requires="a14">
+      <mc:AlternateContent xmlns:mc="http://schemas.openxmlformats.org/markup-compatibility/2006" xmlns:a14="http://schemas.microsoft.com/office/drawing/2010/main">
+        <mc:Choice Requires="a14">
           <p:sp>
             <p:nvSpPr>
               <p:cNvPr id="3" name="Content Placeholder 2"/>
@@ -13331,11 +13447,7 @@
               <a:p>
                 <a:r>
                   <a:rPr lang="en-US" dirty="0"/>
-                  <a:t>Forward mapping – Map each pixel </a:t>
-                </a:r>
-                <a:r>
-                  <a:rPr lang="en-US" dirty="0"/>
-                  <a:t>(</a:t>
+                  <a:t>Forward mapping – Map each pixel (</a:t>
                 </a:r>
                 <a:r>
                   <a:rPr lang="en-US" dirty="0" err="1"/>
@@ -13343,11 +13455,7 @@
                 </a:r>
                 <a:r>
                   <a:rPr lang="en-US" dirty="0"/>
-                  <a:t>) </a:t>
-                </a:r>
-                <a:r>
-                  <a:rPr lang="en-US" dirty="0"/>
-                  <a:t>from original image to (</a:t>
+                  <a:t>) from original image to (</a:t>
                 </a:r>
                 <a:r>
                   <a:rPr lang="en-US" dirty="0" err="1"/>
@@ -13497,7 +13605,7 @@
             </p:txBody>
           </p:sp>
         </mc:Choice>
-        <mc:Fallback>
+        <mc:Fallback xmlns="">
           <p:sp>
             <p:nvSpPr>
               <p:cNvPr id="3" name="Content Placeholder 2"/>
@@ -13584,8 +13692,8 @@
           </a:p>
         </p:txBody>
       </p:sp>
-      <mc:AlternateContent xmlns:mc="http://schemas.openxmlformats.org/markup-compatibility/2006">
-        <mc:Choice xmlns:a14="http://schemas.microsoft.com/office/drawing/2010/main" Requires="a14">
+      <mc:AlternateContent xmlns:mc="http://schemas.openxmlformats.org/markup-compatibility/2006" xmlns:a14="http://schemas.microsoft.com/office/drawing/2010/main">
+        <mc:Choice Requires="a14">
           <p:sp>
             <p:nvSpPr>
               <p:cNvPr id="3" name="Content Placeholder 2"/>
@@ -14196,7 +14304,7 @@
             </p:txBody>
           </p:sp>
         </mc:Choice>
-        <mc:Fallback>
+        <mc:Fallback xmlns="">
           <p:sp>
             <p:nvSpPr>
               <p:cNvPr id="3" name="Content Placeholder 2"/>
@@ -14277,80 +14385,7 @@
           <a:p>
             <a:r>
               <a:rPr lang="en-US" dirty="0" smtClean="0"/>
-              <a:t>Not the Best Solution</a:t>
-            </a:r>
-            <a:endParaRPr lang="en-US" dirty="0"/>
-          </a:p>
-        </p:txBody>
-      </p:sp>
-      <p:sp>
-        <p:nvSpPr>
-          <p:cNvPr id="3" name="Content Placeholder 2"/>
-          <p:cNvSpPr>
-            <a:spLocks noGrp="1"/>
-          </p:cNvSpPr>
-          <p:nvPr>
-            <p:ph idx="1"/>
-          </p:nvPr>
-        </p:nvSpPr>
-        <p:spPr>
-          <a:xfrm>
-            <a:off x="684212" y="685800"/>
-            <a:ext cx="6171047" cy="3615267"/>
-          </a:xfrm>
-        </p:spPr>
-        <p:txBody>
-          <a:bodyPr/>
-          <a:lstStyle/>
-          <a:p>
-            <a:r>
-              <a:rPr lang="en-US" dirty="0" smtClean="0"/>
-              <a:t>Works well </a:t>
-            </a:r>
-            <a:r>
-              <a:rPr lang="en-US" dirty="0" smtClean="0"/>
-              <a:t>for mapping</a:t>
-            </a:r>
-            <a:r>
-              <a:rPr lang="en-US" dirty="0" smtClean="0"/>
-              <a:t> triangles</a:t>
-            </a:r>
-            <a:endParaRPr lang="en-US" dirty="0" smtClean="0"/>
-          </a:p>
-          <a:p>
-            <a:r>
-              <a:rPr lang="en-US" dirty="0" smtClean="0"/>
-              <a:t>Done </a:t>
-            </a:r>
-            <a:r>
-              <a:rPr lang="en-US" dirty="0" smtClean="0"/>
-              <a:t>piecewise </a:t>
-            </a:r>
-            <a:r>
-              <a:rPr lang="en-US" dirty="0" smtClean="0"/>
-              <a:t>on other shapes</a:t>
-            </a:r>
-          </a:p>
-          <a:p>
-            <a:r>
-              <a:rPr lang="en-US" dirty="0" smtClean="0"/>
-              <a:t>The transformation is </a:t>
-            </a:r>
-            <a:r>
-              <a:rPr lang="en-US" dirty="0" smtClean="0"/>
-              <a:t>continuous</a:t>
-            </a:r>
-            <a:r>
-              <a:rPr lang="en-US" dirty="0" smtClean="0"/>
-              <a:t>, b</a:t>
-            </a:r>
-            <a:r>
-              <a:rPr lang="en-US" dirty="0" smtClean="0"/>
-              <a:t>ut </a:t>
-            </a:r>
-            <a:r>
-              <a:rPr lang="en-US" dirty="0" smtClean="0"/>
-              <a:t>there is discontinuity in the first derivative</a:t>
+              <a:t>Bilinear Interpolation</a:t>
             </a:r>
             <a:endParaRPr lang="en-US" dirty="0"/>
           </a:p>
@@ -14358,11 +14393,13 @@
       </p:sp>
       <p:pic>
         <p:nvPicPr>
-          <p:cNvPr id="7" name="Picture 6"/>
+          <p:cNvPr id="4" name="Content Placeholder 3"/>
           <p:cNvPicPr>
-            <a:picLocks noChangeAspect="1"/>
+            <a:picLocks noGrp="1" noChangeAspect="1"/>
           </p:cNvPicPr>
-          <p:nvPr/>
+          <p:nvPr>
+            <p:ph idx="1"/>
+          </p:nvPr>
         </p:nvPicPr>
         <p:blipFill>
           <a:blip r:embed="rId2">
@@ -14378,18 +14415,340 @@
         </p:blipFill>
         <p:spPr>
           <a:xfrm>
-            <a:off x="6855259" y="1091045"/>
-            <a:ext cx="4726706" cy="2836719"/>
+            <a:off x="6530479" y="490821"/>
+            <a:ext cx="3658304" cy="3498254"/>
+          </a:xfrm>
+        </p:spPr>
+      </p:pic>
+      <p:sp>
+        <p:nvSpPr>
+          <p:cNvPr id="5" name="Content Placeholder 2"/>
+          <p:cNvSpPr txBox="1">
+            <a:spLocks/>
+          </p:cNvSpPr>
+          <p:nvPr/>
+        </p:nvSpPr>
+        <p:spPr>
+          <a:xfrm>
+            <a:off x="434830" y="373808"/>
+            <a:ext cx="6171047" cy="3615267"/>
           </a:xfrm>
           <a:prstGeom prst="rect">
             <a:avLst/>
           </a:prstGeom>
         </p:spPr>
-      </p:pic>
+        <p:txBody>
+          <a:bodyPr vert="horz" lIns="91440" tIns="45720" rIns="91440" bIns="45720" rtlCol="0" anchor="ctr">
+            <a:normAutofit/>
+          </a:bodyPr>
+          <a:lstStyle>
+            <a:lvl1pPr marL="285750" indent="-285750" algn="l" defTabSz="457200" rtl="0" eaLnBrk="1" latinLnBrk="0" hangingPunct="1">
+              <a:spcBef>
+                <a:spcPct val="20000"/>
+              </a:spcBef>
+              <a:spcAft>
+                <a:spcPts val="600"/>
+              </a:spcAft>
+              <a:buClr>
+                <a:schemeClr val="tx1"/>
+              </a:buClr>
+              <a:buSzPct val="80000"/>
+              <a:buFont typeface="Wingdings 3" panose="05040102010807070707" pitchFamily="18" charset="2"/>
+              <a:buChar char=""/>
+              <a:defRPr sz="2000" kern="1200" cap="none">
+                <a:solidFill>
+                  <a:schemeClr val="bg2">
+                    <a:lumMod val="75000"/>
+                  </a:schemeClr>
+                </a:solidFill>
+                <a:effectLst/>
+                <a:latin typeface="+mn-lt"/>
+                <a:ea typeface="+mn-ea"/>
+                <a:cs typeface="+mn-cs"/>
+              </a:defRPr>
+            </a:lvl1pPr>
+            <a:lvl2pPr marL="742950" indent="-285750" algn="l" defTabSz="457200" rtl="0" eaLnBrk="1" latinLnBrk="0" hangingPunct="1">
+              <a:spcBef>
+                <a:spcPct val="20000"/>
+              </a:spcBef>
+              <a:spcAft>
+                <a:spcPts val="600"/>
+              </a:spcAft>
+              <a:buClr>
+                <a:schemeClr val="tx1"/>
+              </a:buClr>
+              <a:buSzPct val="80000"/>
+              <a:buFont typeface="Wingdings 3" panose="05040102010807070707" pitchFamily="18" charset="2"/>
+              <a:buChar char=""/>
+              <a:defRPr sz="1800" kern="1200" cap="none">
+                <a:solidFill>
+                  <a:schemeClr val="bg2">
+                    <a:lumMod val="75000"/>
+                  </a:schemeClr>
+                </a:solidFill>
+                <a:effectLst/>
+                <a:latin typeface="+mn-lt"/>
+                <a:ea typeface="+mn-ea"/>
+                <a:cs typeface="+mn-cs"/>
+              </a:defRPr>
+            </a:lvl2pPr>
+            <a:lvl3pPr marL="1200150" indent="-285750" algn="l" defTabSz="457200" rtl="0" eaLnBrk="1" latinLnBrk="0" hangingPunct="1">
+              <a:spcBef>
+                <a:spcPct val="20000"/>
+              </a:spcBef>
+              <a:spcAft>
+                <a:spcPts val="600"/>
+              </a:spcAft>
+              <a:buClr>
+                <a:schemeClr val="tx1"/>
+              </a:buClr>
+              <a:buSzPct val="80000"/>
+              <a:buFont typeface="Wingdings 3" panose="05040102010807070707" pitchFamily="18" charset="2"/>
+              <a:buChar char=""/>
+              <a:defRPr sz="1600" kern="1200" cap="none">
+                <a:solidFill>
+                  <a:schemeClr val="bg2">
+                    <a:lumMod val="75000"/>
+                  </a:schemeClr>
+                </a:solidFill>
+                <a:effectLst/>
+                <a:latin typeface="+mn-lt"/>
+                <a:ea typeface="+mn-ea"/>
+                <a:cs typeface="+mn-cs"/>
+              </a:defRPr>
+            </a:lvl3pPr>
+            <a:lvl4pPr marL="1543050" indent="-171450" algn="l" defTabSz="457200" rtl="0" eaLnBrk="1" latinLnBrk="0" hangingPunct="1">
+              <a:spcBef>
+                <a:spcPct val="20000"/>
+              </a:spcBef>
+              <a:spcAft>
+                <a:spcPts val="600"/>
+              </a:spcAft>
+              <a:buClr>
+                <a:schemeClr val="tx1"/>
+              </a:buClr>
+              <a:buSzPct val="80000"/>
+              <a:buFont typeface="Wingdings 3" panose="05040102010807070707" pitchFamily="18" charset="2"/>
+              <a:buChar char=""/>
+              <a:defRPr sz="1400" kern="1200" cap="none">
+                <a:solidFill>
+                  <a:schemeClr val="bg2">
+                    <a:lumMod val="75000"/>
+                  </a:schemeClr>
+                </a:solidFill>
+                <a:effectLst/>
+                <a:latin typeface="+mn-lt"/>
+                <a:ea typeface="+mn-ea"/>
+                <a:cs typeface="+mn-cs"/>
+              </a:defRPr>
+            </a:lvl4pPr>
+            <a:lvl5pPr marL="2000250" indent="-171450" algn="l" defTabSz="457200" rtl="0" eaLnBrk="1" latinLnBrk="0" hangingPunct="1">
+              <a:spcBef>
+                <a:spcPct val="20000"/>
+              </a:spcBef>
+              <a:spcAft>
+                <a:spcPts val="600"/>
+              </a:spcAft>
+              <a:buClr>
+                <a:schemeClr val="tx1"/>
+              </a:buClr>
+              <a:buSzPct val="80000"/>
+              <a:buFont typeface="Wingdings 3" panose="05040102010807070707" pitchFamily="18" charset="2"/>
+              <a:buChar char=""/>
+              <a:defRPr sz="1400" kern="1200" cap="none">
+                <a:solidFill>
+                  <a:schemeClr val="bg2">
+                    <a:lumMod val="75000"/>
+                  </a:schemeClr>
+                </a:solidFill>
+                <a:effectLst/>
+                <a:latin typeface="+mn-lt"/>
+                <a:ea typeface="+mn-ea"/>
+                <a:cs typeface="+mn-cs"/>
+              </a:defRPr>
+            </a:lvl5pPr>
+            <a:lvl6pPr marL="2514600" indent="-228600" algn="l" defTabSz="457200" rtl="0" eaLnBrk="1" latinLnBrk="0" hangingPunct="1">
+              <a:spcBef>
+                <a:spcPct val="20000"/>
+              </a:spcBef>
+              <a:spcAft>
+                <a:spcPts val="600"/>
+              </a:spcAft>
+              <a:buClr>
+                <a:schemeClr val="tx1"/>
+              </a:buClr>
+              <a:buSzPct val="80000"/>
+              <a:buFont typeface="Wingdings 3" panose="05040102010807070707" pitchFamily="18" charset="2"/>
+              <a:buChar char=""/>
+              <a:defRPr sz="1400" kern="1200" cap="none">
+                <a:solidFill>
+                  <a:schemeClr val="bg2">
+                    <a:lumMod val="75000"/>
+                  </a:schemeClr>
+                </a:solidFill>
+                <a:effectLst/>
+                <a:latin typeface="+mn-lt"/>
+                <a:ea typeface="+mn-ea"/>
+                <a:cs typeface="+mn-cs"/>
+              </a:defRPr>
+            </a:lvl6pPr>
+            <a:lvl7pPr marL="2971800" indent="-228600" algn="l" defTabSz="457200" rtl="0" eaLnBrk="1" latinLnBrk="0" hangingPunct="1">
+              <a:spcBef>
+                <a:spcPct val="20000"/>
+              </a:spcBef>
+              <a:spcAft>
+                <a:spcPts val="600"/>
+              </a:spcAft>
+              <a:buClr>
+                <a:schemeClr val="tx1"/>
+              </a:buClr>
+              <a:buSzPct val="80000"/>
+              <a:buFont typeface="Wingdings 3" panose="05040102010807070707" pitchFamily="18" charset="2"/>
+              <a:buChar char=""/>
+              <a:defRPr sz="1400" kern="1200" cap="none">
+                <a:solidFill>
+                  <a:schemeClr val="bg2">
+                    <a:lumMod val="75000"/>
+                  </a:schemeClr>
+                </a:solidFill>
+                <a:effectLst/>
+                <a:latin typeface="+mn-lt"/>
+                <a:ea typeface="+mn-ea"/>
+                <a:cs typeface="+mn-cs"/>
+              </a:defRPr>
+            </a:lvl7pPr>
+            <a:lvl8pPr marL="3429000" indent="-228600" algn="l" defTabSz="457200" rtl="0" eaLnBrk="1" latinLnBrk="0" hangingPunct="1">
+              <a:spcBef>
+                <a:spcPct val="20000"/>
+              </a:spcBef>
+              <a:spcAft>
+                <a:spcPts val="600"/>
+              </a:spcAft>
+              <a:buClr>
+                <a:schemeClr val="tx1"/>
+              </a:buClr>
+              <a:buSzPct val="80000"/>
+              <a:buFont typeface="Wingdings 3" panose="05040102010807070707" pitchFamily="18" charset="2"/>
+              <a:buChar char=""/>
+              <a:defRPr sz="1400" kern="1200" cap="none">
+                <a:solidFill>
+                  <a:schemeClr val="bg2">
+                    <a:lumMod val="75000"/>
+                  </a:schemeClr>
+                </a:solidFill>
+                <a:effectLst/>
+                <a:latin typeface="+mn-lt"/>
+                <a:ea typeface="+mn-ea"/>
+                <a:cs typeface="+mn-cs"/>
+              </a:defRPr>
+            </a:lvl8pPr>
+            <a:lvl9pPr marL="3886200" indent="-228600" algn="l" defTabSz="457200" rtl="0" eaLnBrk="1" latinLnBrk="0" hangingPunct="1">
+              <a:spcBef>
+                <a:spcPct val="20000"/>
+              </a:spcBef>
+              <a:spcAft>
+                <a:spcPts val="600"/>
+              </a:spcAft>
+              <a:buClr>
+                <a:schemeClr val="tx1"/>
+              </a:buClr>
+              <a:buSzPct val="80000"/>
+              <a:buFont typeface="Wingdings 3" panose="05040102010807070707" pitchFamily="18" charset="2"/>
+              <a:buChar char=""/>
+              <a:defRPr sz="1400" kern="1200" cap="none">
+                <a:solidFill>
+                  <a:schemeClr val="bg2">
+                    <a:lumMod val="75000"/>
+                  </a:schemeClr>
+                </a:solidFill>
+                <a:effectLst/>
+                <a:latin typeface="+mn-lt"/>
+                <a:ea typeface="+mn-ea"/>
+                <a:cs typeface="+mn-cs"/>
+              </a:defRPr>
+            </a:lvl9pPr>
+          </a:lstStyle>
+          <a:p>
+            <a:r>
+              <a:rPr lang="pt-BR" dirty="0"/>
+              <a:t>R1 = ((x2 – x)/(x2 – x1))*Q11 + </a:t>
+            </a:r>
+            <a:endParaRPr lang="pt-BR" dirty="0" smtClean="0"/>
+          </a:p>
+          <a:p>
+            <a:pPr marL="0" indent="0">
+              <a:buNone/>
+            </a:pPr>
+            <a:r>
+              <a:rPr lang="pt-BR" dirty="0"/>
+              <a:t>	</a:t>
+            </a:r>
+            <a:r>
+              <a:rPr lang="pt-BR" dirty="0" smtClean="0"/>
+              <a:t>	((</a:t>
+            </a:r>
+            <a:r>
+              <a:rPr lang="pt-BR" dirty="0"/>
+              <a:t>x – x1)/(x2 – x1))*</a:t>
+            </a:r>
+            <a:r>
+              <a:rPr lang="pt-BR" dirty="0" smtClean="0"/>
+              <a:t>Q21</a:t>
+            </a:r>
+          </a:p>
+          <a:p>
+            <a:r>
+              <a:rPr lang="pt-BR" dirty="0"/>
+              <a:t>R2 = ((x2 – x)/(x2 – x1))*Q12 + </a:t>
+            </a:r>
+            <a:endParaRPr lang="pt-BR" dirty="0" smtClean="0"/>
+          </a:p>
+          <a:p>
+            <a:pPr marL="0" indent="0">
+              <a:buNone/>
+            </a:pPr>
+            <a:r>
+              <a:rPr lang="pt-BR" dirty="0"/>
+              <a:t>	</a:t>
+            </a:r>
+            <a:r>
+              <a:rPr lang="pt-BR" dirty="0" smtClean="0"/>
+              <a:t>	((</a:t>
+            </a:r>
+            <a:r>
+              <a:rPr lang="pt-BR" dirty="0"/>
+              <a:t>x – x1)/(x2 – x1))*</a:t>
+            </a:r>
+            <a:r>
+              <a:rPr lang="pt-BR" dirty="0" smtClean="0"/>
+              <a:t>Q22</a:t>
+            </a:r>
+          </a:p>
+          <a:p>
+            <a:r>
+              <a:rPr lang="es-ES" dirty="0"/>
+              <a:t>P = ((y2 – y)/(y2 – y1))*R1 + </a:t>
+            </a:r>
+            <a:endParaRPr lang="es-ES" dirty="0" smtClean="0"/>
+          </a:p>
+          <a:p>
+            <a:pPr lvl="1"/>
+            <a:r>
+              <a:rPr lang="es-ES" dirty="0" smtClean="0"/>
+              <a:t>((</a:t>
+            </a:r>
+            <a:r>
+              <a:rPr lang="es-ES" dirty="0"/>
+              <a:t>y – y1)/(y2 – y1))*R2</a:t>
+            </a:r>
+            <a:endParaRPr lang="pt-BR" dirty="0"/>
+          </a:p>
+        </p:txBody>
+      </p:sp>
     </p:spTree>
     <p:extLst>
       <p:ext uri="{BB962C8B-B14F-4D97-AF65-F5344CB8AC3E}">
-        <p14:creationId xmlns:p14="http://schemas.microsoft.com/office/powerpoint/2010/main" val="4098256161"/>
+        <p14:creationId xmlns:p14="http://schemas.microsoft.com/office/powerpoint/2010/main" val="3985043249"/>
       </p:ext>
     </p:extLst>
   </p:cSld>

</xml_diff>